<commit_message>
Fix Pin Labels in Pin Pair Figure.
Embarrasingly, the fields shown for configurations A and A' did not match the voltage labels added above the pins in powerpoint.
</commit_message>
<xml_diff>
--- a/Configurations/pinpairformal.pptx
+++ b/Configurations/pinpairformal.pptx
@@ -107,6 +107,11 @@
       </a:defRPr>
     </a:lvl9pPr>
   </p:defaultTextStyle>
+  <p:extLst>
+    <p:ext uri="{EFAFB233-063F-42B5-8137-9DF3F51BA10A}">
+      <p15:sldGuideLst xmlns:p15="http://schemas.microsoft.com/office/powerpoint/2012/main"/>
+    </p:ext>
+  </p:extLst>
 </p:presentation>
 </file>
 
@@ -192,7 +197,7 @@
           <a:p>
             <a:fld id="{25C52187-5773-3143-91F4-BAB28BBD7C2E}" type="datetimeFigureOut">
               <a:rPr lang="en-US" smtClean="0"/>
-              <a:t>4/23/19</a:t>
+              <a:t>4/24/19</a:t>
             </a:fld>
             <a:endParaRPr lang="en-US"/>
           </a:p>
@@ -680,7 +685,7 @@
           <a:p>
             <a:fld id="{50B6532A-4DED-2745-914B-B7E493FC0427}" type="datetimeFigureOut">
               <a:rPr lang="en-US" smtClean="0"/>
-              <a:t>4/23/19</a:t>
+              <a:t>4/24/19</a:t>
             </a:fld>
             <a:endParaRPr lang="en-US"/>
           </a:p>
@@ -845,7 +850,7 @@
           <a:p>
             <a:fld id="{50B6532A-4DED-2745-914B-B7E493FC0427}" type="datetimeFigureOut">
               <a:rPr lang="en-US" smtClean="0"/>
-              <a:t>4/23/19</a:t>
+              <a:t>4/24/19</a:t>
             </a:fld>
             <a:endParaRPr lang="en-US"/>
           </a:p>
@@ -1020,7 +1025,7 @@
           <a:p>
             <a:fld id="{50B6532A-4DED-2745-914B-B7E493FC0427}" type="datetimeFigureOut">
               <a:rPr lang="en-US" smtClean="0"/>
-              <a:t>4/23/19</a:t>
+              <a:t>4/24/19</a:t>
             </a:fld>
             <a:endParaRPr lang="en-US"/>
           </a:p>
@@ -1185,7 +1190,7 @@
           <a:p>
             <a:fld id="{50B6532A-4DED-2745-914B-B7E493FC0427}" type="datetimeFigureOut">
               <a:rPr lang="en-US" smtClean="0"/>
-              <a:t>4/23/19</a:t>
+              <a:t>4/24/19</a:t>
             </a:fld>
             <a:endParaRPr lang="en-US"/>
           </a:p>
@@ -1426,7 +1431,7 @@
           <a:p>
             <a:fld id="{50B6532A-4DED-2745-914B-B7E493FC0427}" type="datetimeFigureOut">
               <a:rPr lang="en-US" smtClean="0"/>
-              <a:t>4/23/19</a:t>
+              <a:t>4/24/19</a:t>
             </a:fld>
             <a:endParaRPr lang="en-US"/>
           </a:p>
@@ -1653,7 +1658,7 @@
           <a:p>
             <a:fld id="{50B6532A-4DED-2745-914B-B7E493FC0427}" type="datetimeFigureOut">
               <a:rPr lang="en-US" smtClean="0"/>
-              <a:t>4/23/19</a:t>
+              <a:t>4/24/19</a:t>
             </a:fld>
             <a:endParaRPr lang="en-US"/>
           </a:p>
@@ -2015,7 +2020,7 @@
           <a:p>
             <a:fld id="{50B6532A-4DED-2745-914B-B7E493FC0427}" type="datetimeFigureOut">
               <a:rPr lang="en-US" smtClean="0"/>
-              <a:t>4/23/19</a:t>
+              <a:t>4/24/19</a:t>
             </a:fld>
             <a:endParaRPr lang="en-US"/>
           </a:p>
@@ -2128,7 +2133,7 @@
           <a:p>
             <a:fld id="{50B6532A-4DED-2745-914B-B7E493FC0427}" type="datetimeFigureOut">
               <a:rPr lang="en-US" smtClean="0"/>
-              <a:t>4/23/19</a:t>
+              <a:t>4/24/19</a:t>
             </a:fld>
             <a:endParaRPr lang="en-US"/>
           </a:p>
@@ -2218,7 +2223,7 @@
           <a:p>
             <a:fld id="{50B6532A-4DED-2745-914B-B7E493FC0427}" type="datetimeFigureOut">
               <a:rPr lang="en-US" smtClean="0"/>
-              <a:t>4/23/19</a:t>
+              <a:t>4/24/19</a:t>
             </a:fld>
             <a:endParaRPr lang="en-US"/>
           </a:p>
@@ -2490,7 +2495,7 @@
           <a:p>
             <a:fld id="{50B6532A-4DED-2745-914B-B7E493FC0427}" type="datetimeFigureOut">
               <a:rPr lang="en-US" smtClean="0"/>
-              <a:t>4/23/19</a:t>
+              <a:t>4/24/19</a:t>
             </a:fld>
             <a:endParaRPr lang="en-US"/>
           </a:p>
@@ -2742,7 +2747,7 @@
           <a:p>
             <a:fld id="{50B6532A-4DED-2745-914B-B7E493FC0427}" type="datetimeFigureOut">
               <a:rPr lang="en-US" smtClean="0"/>
-              <a:t>4/23/19</a:t>
+              <a:t>4/24/19</a:t>
             </a:fld>
             <a:endParaRPr lang="en-US"/>
           </a:p>
@@ -2950,7 +2955,7 @@
           <a:p>
             <a:fld id="{50B6532A-4DED-2745-914B-B7E493FC0427}" type="datetimeFigureOut">
               <a:rPr lang="en-US" smtClean="0"/>
-              <a:t>4/23/19</a:t>
+              <a:t>4/24/19</a:t>
             </a:fld>
             <a:endParaRPr lang="en-US"/>
           </a:p>
@@ -4131,7 +4136,7 @@
         </p:nvGrpSpPr>
         <p:grpSpPr>
           <a:xfrm>
-            <a:off x="416119" y="-34517"/>
+            <a:off x="411060" y="1448520"/>
             <a:ext cx="3707678" cy="1475998"/>
             <a:chOff x="454519" y="36920"/>
             <a:chExt cx="3707678" cy="1475998"/>
@@ -4205,11 +4210,6 @@
                 </a:rPr>
                 <a:t>+</a:t>
               </a:r>
-              <a:endParaRPr lang="en-US" sz="2400" dirty="0">
-                <a:solidFill>
-                  <a:schemeClr val="bg1"/>
-                </a:solidFill>
-              </a:endParaRPr>
             </a:p>
           </p:txBody>
         </p:sp>
@@ -4243,11 +4243,6 @@
                 </a:rPr>
                 <a:t>+</a:t>
               </a:r>
-              <a:endParaRPr lang="en-US" sz="2400" dirty="0">
-                <a:solidFill>
-                  <a:schemeClr val="bg1"/>
-                </a:solidFill>
-              </a:endParaRPr>
             </a:p>
           </p:txBody>
         </p:sp>
@@ -4281,11 +4276,6 @@
                 </a:rPr>
                 <a:t>—</a:t>
               </a:r>
-              <a:endParaRPr lang="en-US" b="1" dirty="0">
-                <a:solidFill>
-                  <a:schemeClr val="bg1"/>
-                </a:solidFill>
-              </a:endParaRPr>
             </a:p>
           </p:txBody>
         </p:sp>
@@ -4319,11 +4309,6 @@
                 </a:rPr>
                 <a:t>—</a:t>
               </a:r>
-              <a:endParaRPr lang="en-US" b="1" dirty="0">
-                <a:solidFill>
-                  <a:schemeClr val="bg1"/>
-                </a:solidFill>
-              </a:endParaRPr>
             </a:p>
           </p:txBody>
         </p:sp>
@@ -4830,7 +4815,7 @@
             <a:lstStyle/>
             <a:p>
               <a:r>
-                <a:rPr lang="en-US" sz="2400" dirty="0">
+                <a:rPr lang="en-US" sz="2400" dirty="0" smtClean="0">
                   <a:ln w="19050">
                     <a:noFill/>
                   </a:ln>
@@ -4843,7 +4828,7 @@
                     </a:glow>
                   </a:effectLst>
                 </a:rPr>
-                <a:t>A</a:t>
+                <a:t>A'</a:t>
               </a:r>
               <a:endParaRPr lang="en-US" sz="2400" dirty="0">
                 <a:ln w="19050">
@@ -4870,7 +4855,7 @@
         </p:nvGrpSpPr>
         <p:grpSpPr>
           <a:xfrm>
-            <a:off x="416119" y="1481316"/>
+            <a:off x="415271" y="-4476"/>
             <a:ext cx="3707678" cy="1441709"/>
             <a:chOff x="454519" y="1552752"/>
             <a:chExt cx="3707678" cy="1441709"/>
@@ -4941,11 +4926,6 @@
                 </a:rPr>
                 <a:t>+</a:t>
               </a:r>
-              <a:endParaRPr lang="en-US" sz="2400" dirty="0">
-                <a:solidFill>
-                  <a:schemeClr val="bg1"/>
-                </a:solidFill>
-              </a:endParaRPr>
             </a:p>
           </p:txBody>
         </p:sp>
@@ -4979,11 +4959,6 @@
                 </a:rPr>
                 <a:t>+</a:t>
               </a:r>
-              <a:endParaRPr lang="en-US" sz="2400" dirty="0">
-                <a:solidFill>
-                  <a:schemeClr val="bg1"/>
-                </a:solidFill>
-              </a:endParaRPr>
             </a:p>
           </p:txBody>
         </p:sp>
@@ -5017,11 +4992,6 @@
                 </a:rPr>
                 <a:t>—</a:t>
               </a:r>
-              <a:endParaRPr lang="en-US" b="1" dirty="0">
-                <a:solidFill>
-                  <a:schemeClr val="bg1"/>
-                </a:solidFill>
-              </a:endParaRPr>
             </a:p>
           </p:txBody>
         </p:sp>
@@ -5055,11 +5025,6 @@
                 </a:rPr>
                 <a:t>—</a:t>
               </a:r>
-              <a:endParaRPr lang="en-US" b="1" dirty="0">
-                <a:solidFill>
-                  <a:schemeClr val="bg1"/>
-                </a:solidFill>
-              </a:endParaRPr>
             </a:p>
           </p:txBody>
         </p:sp>
@@ -5566,7 +5531,7 @@
             <a:lstStyle/>
             <a:p>
               <a:r>
-                <a:rPr lang="en-US" sz="2400" dirty="0">
+                <a:rPr lang="en-US" sz="2400" dirty="0" smtClean="0">
                   <a:ln w="19050">
                     <a:noFill/>
                   </a:ln>
@@ -5579,7 +5544,7 @@
                     </a:glow>
                   </a:effectLst>
                 </a:rPr>
-                <a:t>A'</a:t>
+                <a:t>A</a:t>
               </a:r>
               <a:endParaRPr lang="en-US" sz="2400" dirty="0">
                 <a:ln w="19050">
@@ -5677,11 +5642,6 @@
                 </a:rPr>
                 <a:t>+</a:t>
               </a:r>
-              <a:endParaRPr lang="en-US" sz="2400" dirty="0">
-                <a:solidFill>
-                  <a:schemeClr val="bg1"/>
-                </a:solidFill>
-              </a:endParaRPr>
             </a:p>
           </p:txBody>
         </p:sp>
@@ -5715,11 +5675,6 @@
                 </a:rPr>
                 <a:t>+</a:t>
               </a:r>
-              <a:endParaRPr lang="en-US" sz="2400" dirty="0">
-                <a:solidFill>
-                  <a:schemeClr val="bg1"/>
-                </a:solidFill>
-              </a:endParaRPr>
             </a:p>
           </p:txBody>
         </p:sp>
@@ -5753,11 +5708,6 @@
                 </a:rPr>
                 <a:t>+</a:t>
               </a:r>
-              <a:endParaRPr lang="en-US" sz="2400" dirty="0">
-                <a:solidFill>
-                  <a:schemeClr val="bg1"/>
-                </a:solidFill>
-              </a:endParaRPr>
             </a:p>
           </p:txBody>
         </p:sp>
@@ -5791,11 +5741,6 @@
                 </a:rPr>
                 <a:t>+</a:t>
               </a:r>
-              <a:endParaRPr lang="en-US" sz="2400" dirty="0">
-                <a:solidFill>
-                  <a:schemeClr val="bg1"/>
-                </a:solidFill>
-              </a:endParaRPr>
             </a:p>
           </p:txBody>
         </p:sp>
@@ -6317,19 +6262,6 @@
                 </a:rPr>
                 <a:t>B</a:t>
               </a:r>
-              <a:endParaRPr lang="en-US" sz="2400" dirty="0">
-                <a:ln w="19050">
-                  <a:noFill/>
-                </a:ln>
-                <a:solidFill>
-                  <a:schemeClr val="bg1"/>
-                </a:solidFill>
-                <a:effectLst>
-                  <a:glow rad="63500">
-                    <a:schemeClr val="tx1"/>
-                  </a:glow>
-                </a:effectLst>
-              </a:endParaRPr>
             </a:p>
           </p:txBody>
         </p:sp>
@@ -6413,11 +6345,6 @@
                 </a:rPr>
                 <a:t>+</a:t>
               </a:r>
-              <a:endParaRPr lang="en-US" sz="2400" dirty="0">
-                <a:solidFill>
-                  <a:schemeClr val="bg1"/>
-                </a:solidFill>
-              </a:endParaRPr>
             </a:p>
           </p:txBody>
         </p:sp>
@@ -6451,11 +6378,6 @@
                 </a:rPr>
                 <a:t>+</a:t>
               </a:r>
-              <a:endParaRPr lang="en-US" sz="2400" dirty="0">
-                <a:solidFill>
-                  <a:schemeClr val="bg1"/>
-                </a:solidFill>
-              </a:endParaRPr>
             </a:p>
           </p:txBody>
         </p:sp>
@@ -6489,11 +6411,6 @@
                 </a:rPr>
                 <a:t>+</a:t>
               </a:r>
-              <a:endParaRPr lang="en-US" sz="2400" dirty="0">
-                <a:solidFill>
-                  <a:schemeClr val="bg1"/>
-                </a:solidFill>
-              </a:endParaRPr>
             </a:p>
           </p:txBody>
         </p:sp>
@@ -6527,11 +6444,6 @@
                 </a:rPr>
                 <a:t>+</a:t>
               </a:r>
-              <a:endParaRPr lang="en-US" sz="2400" dirty="0">
-                <a:solidFill>
-                  <a:schemeClr val="bg1"/>
-                </a:solidFill>
-              </a:endParaRPr>
             </a:p>
           </p:txBody>
         </p:sp>
@@ -6565,11 +6477,6 @@
                 </a:rPr>
                 <a:t>—</a:t>
               </a:r>
-              <a:endParaRPr lang="en-US" b="1" dirty="0">
-                <a:solidFill>
-                  <a:schemeClr val="bg1"/>
-                </a:solidFill>
-              </a:endParaRPr>
             </a:p>
           </p:txBody>
         </p:sp>
@@ -6603,11 +6510,6 @@
                 </a:rPr>
                 <a:t>—</a:t>
               </a:r>
-              <a:endParaRPr lang="en-US" b="1" dirty="0">
-                <a:solidFill>
-                  <a:schemeClr val="bg1"/>
-                </a:solidFill>
-              </a:endParaRPr>
             </a:p>
           </p:txBody>
         </p:sp>
@@ -6641,11 +6543,6 @@
                 </a:rPr>
                 <a:t>—</a:t>
               </a:r>
-              <a:endParaRPr lang="en-US" b="1" dirty="0">
-                <a:solidFill>
-                  <a:schemeClr val="bg1"/>
-                </a:solidFill>
-              </a:endParaRPr>
             </a:p>
           </p:txBody>
         </p:sp>
@@ -6679,11 +6576,6 @@
                 </a:rPr>
                 <a:t>—</a:t>
               </a:r>
-              <a:endParaRPr lang="en-US" b="1" dirty="0">
-                <a:solidFill>
-                  <a:schemeClr val="bg1"/>
-                </a:solidFill>
-              </a:endParaRPr>
             </a:p>
           </p:txBody>
         </p:sp>
@@ -6725,19 +6617,6 @@
                 </a:rPr>
                 <a:t>C</a:t>
               </a:r>
-              <a:endParaRPr lang="en-US" sz="2400" dirty="0">
-                <a:ln w="19050">
-                  <a:noFill/>
-                </a:ln>
-                <a:solidFill>
-                  <a:schemeClr val="bg1"/>
-                </a:solidFill>
-                <a:effectLst>
-                  <a:glow rad="63500">
-                    <a:schemeClr val="tx1"/>
-                  </a:glow>
-                </a:effectLst>
-              </a:endParaRPr>
             </a:p>
           </p:txBody>
         </p:sp>
@@ -9148,9 +9027,9 @@
         <p:grpSpPr>
           <a:xfrm>
             <a:off x="442700" y="1525553"/>
-            <a:ext cx="3695027" cy="1396877"/>
+            <a:ext cx="3689089" cy="1396877"/>
             <a:chOff x="758497" y="1596989"/>
-            <a:chExt cx="3695027" cy="1396877"/>
+            <a:chExt cx="3689089" cy="1396877"/>
           </a:xfrm>
         </p:grpSpPr>
         <p:grpSp>
@@ -9352,9 +9231,9 @@
           <p:grpSpPr>
             <a:xfrm>
               <a:off x="761528" y="2947483"/>
-              <a:ext cx="3691996" cy="46383"/>
+              <a:ext cx="3686058" cy="46383"/>
               <a:chOff x="1957787" y="5948602"/>
-              <a:chExt cx="3658818" cy="45720"/>
+              <a:chExt cx="3652933" cy="45720"/>
             </a:xfrm>
           </p:grpSpPr>
           <p:cxnSp>
@@ -9365,7 +9244,7 @@
             </p:nvCxnSpPr>
             <p:spPr>
               <a:xfrm>
-                <a:off x="5616605" y="5948602"/>
+                <a:off x="5610720" y="5948602"/>
                 <a:ext cx="0" cy="45720"/>
               </a:xfrm>
               <a:prstGeom prst="line">
@@ -9543,9 +9422,9 @@
         <p:grpSpPr>
           <a:xfrm>
             <a:off x="447484" y="36702"/>
-            <a:ext cx="3695027" cy="1396877"/>
+            <a:ext cx="3689089" cy="1396877"/>
             <a:chOff x="758497" y="1596989"/>
-            <a:chExt cx="3695027" cy="1396877"/>
+            <a:chExt cx="3689089" cy="1396877"/>
           </a:xfrm>
         </p:grpSpPr>
         <p:grpSp>
@@ -9747,9 +9626,9 @@
           <p:grpSpPr>
             <a:xfrm>
               <a:off x="761528" y="2947483"/>
-              <a:ext cx="3691996" cy="46383"/>
+              <a:ext cx="3686058" cy="46383"/>
               <a:chOff x="1957787" y="5948602"/>
-              <a:chExt cx="3658818" cy="45720"/>
+              <a:chExt cx="3652933" cy="45720"/>
             </a:xfrm>
           </p:grpSpPr>
           <p:cxnSp>
@@ -9760,7 +9639,7 @@
             </p:nvCxnSpPr>
             <p:spPr>
               <a:xfrm>
-                <a:off x="5616605" y="5948602"/>
+                <a:off x="5610720" y="5948602"/>
                 <a:ext cx="0" cy="45720"/>
               </a:xfrm>
               <a:prstGeom prst="line">

</xml_diff>